<commit_message>
Update Project template for AI Agent case study[1].pptx
</commit_message>
<xml_diff>
--- a/agent ppt/Project template for AI Agent case study[1].pptx
+++ b/agent ppt/Project template for AI Agent case study[1].pptx
@@ -135,7 +135,7 @@
 <p1510:revInfo xmlns:a="http://schemas.openxmlformats.org/drawingml/2006/main" xmlns:r="http://schemas.openxmlformats.org/officeDocument/2006/relationships" xmlns:p1510="http://schemas.microsoft.com/office/powerpoint/2015/10/main">
   <p1510:revLst>
     <p1510:client id="{2457903D-1D61-4272-A57E-4DC495723D23}" v="59" dt="2025-08-03T15:18:01.099"/>
-    <p1510:client id="{DB8A1A6D-113A-4258-8B07-407461499F32}" v="21" dt="2025-08-04T09:28:53.239"/>
+    <p1510:client id="{DB8A1A6D-113A-4258-8B07-407461499F32}" v="24" dt="2025-08-04T12:59:33.135"/>
   </p1510:revLst>
 </p1510:revInfo>
 </file>
@@ -481,7 +481,7 @@
   <pc:docChgLst>
     <pc:chgData name="Mohd Armaan Z" userId="aed7a2cae28777d3" providerId="LiveId" clId="{DB8A1A6D-113A-4258-8B07-407461499F32}"/>
     <pc:docChg chg="custSel addSld delSld modSld">
-      <pc:chgData name="Mohd Armaan Z" userId="aed7a2cae28777d3" providerId="LiveId" clId="{DB8A1A6D-113A-4258-8B07-407461499F32}" dt="2025-08-04T09:29:03.845" v="101" actId="1076"/>
+      <pc:chgData name="Mohd Armaan Z" userId="aed7a2cae28777d3" providerId="LiveId" clId="{DB8A1A6D-113A-4258-8B07-407461499F32}" dt="2025-08-04T13:00:08.725" v="134" actId="1076"/>
       <pc:docMkLst>
         <pc:docMk/>
       </pc:docMkLst>
@@ -570,7 +570,7 @@
         </pc:spChg>
       </pc:sldChg>
       <pc:sldChg chg="addSp delSp modSp mod">
-        <pc:chgData name="Mohd Armaan Z" userId="aed7a2cae28777d3" providerId="LiveId" clId="{DB8A1A6D-113A-4258-8B07-407461499F32}" dt="2025-08-04T09:29:03.845" v="101" actId="1076"/>
+        <pc:chgData name="Mohd Armaan Z" userId="aed7a2cae28777d3" providerId="LiveId" clId="{DB8A1A6D-113A-4258-8B07-407461499F32}" dt="2025-08-04T13:00:08.725" v="134" actId="1076"/>
         <pc:sldMkLst>
           <pc:docMk/>
           <pc:sldMk cId="1126302864" sldId="2146847068"/>
@@ -583,12 +583,44 @@
             <ac:picMk id="3" creationId="{D5693625-3FD5-932E-3334-F54965E8A468}"/>
           </ac:picMkLst>
         </pc:picChg>
-        <pc:picChg chg="add mod">
-          <ac:chgData name="Mohd Armaan Z" userId="aed7a2cae28777d3" providerId="LiveId" clId="{DB8A1A6D-113A-4258-8B07-407461499F32}" dt="2025-08-04T09:29:03.845" v="101" actId="1076"/>
+        <pc:picChg chg="add del mod">
+          <ac:chgData name="Mohd Armaan Z" userId="aed7a2cae28777d3" providerId="LiveId" clId="{DB8A1A6D-113A-4258-8B07-407461499F32}" dt="2025-08-04T12:59:08.145" v="111" actId="21"/>
+          <ac:picMkLst>
+            <pc:docMk/>
+            <pc:sldMk cId="1126302864" sldId="2146847068"/>
+            <ac:picMk id="4" creationId="{14D18D4E-A97F-EB9D-6899-D9F53DFE1567}"/>
+          </ac:picMkLst>
+        </pc:picChg>
+        <pc:picChg chg="add del mod">
+          <ac:chgData name="Mohd Armaan Z" userId="aed7a2cae28777d3" providerId="LiveId" clId="{DB8A1A6D-113A-4258-8B07-407461499F32}" dt="2025-08-04T12:58:31.059" v="102" actId="21"/>
           <ac:picMkLst>
             <pc:docMk/>
             <pc:sldMk cId="1126302864" sldId="2146847068"/>
             <ac:picMk id="6" creationId="{8AE88E73-E78C-87EA-96EF-8FDA8A7B6C4F}"/>
+          </ac:picMkLst>
+        </pc:picChg>
+        <pc:picChg chg="add del mod">
+          <ac:chgData name="Mohd Armaan Z" userId="aed7a2cae28777d3" providerId="LiveId" clId="{DB8A1A6D-113A-4258-8B07-407461499F32}" dt="2025-08-04T12:59:08.145" v="111" actId="21"/>
+          <ac:picMkLst>
+            <pc:docMk/>
+            <pc:sldMk cId="1126302864" sldId="2146847068"/>
+            <ac:picMk id="8" creationId="{F18DAB9C-F874-8B00-F579-A14411E32982}"/>
+          </ac:picMkLst>
+        </pc:picChg>
+        <pc:picChg chg="add mod">
+          <ac:chgData name="Mohd Armaan Z" userId="aed7a2cae28777d3" providerId="LiveId" clId="{DB8A1A6D-113A-4258-8B07-407461499F32}" dt="2025-08-04T12:59:47.685" v="128" actId="1076"/>
+          <ac:picMkLst>
+            <pc:docMk/>
+            <pc:sldMk cId="1126302864" sldId="2146847068"/>
+            <ac:picMk id="10" creationId="{0E17932B-3639-0E78-BCDA-11B881B5A52E}"/>
+          </ac:picMkLst>
+        </pc:picChg>
+        <pc:picChg chg="add mod">
+          <ac:chgData name="Mohd Armaan Z" userId="aed7a2cae28777d3" providerId="LiveId" clId="{DB8A1A6D-113A-4258-8B07-407461499F32}" dt="2025-08-04T13:00:08.725" v="134" actId="1076"/>
+          <ac:picMkLst>
+            <pc:docMk/>
+            <pc:sldMk cId="1126302864" sldId="2146847068"/>
+            <ac:picMk id="12" creationId="{75E281A2-7B04-8121-CEC8-4AEA842E108E}"/>
           </ac:picMkLst>
         </pc:picChg>
       </pc:sldChg>
@@ -5133,10 +5165,10 @@
       </p:sp>
       <p:pic>
         <p:nvPicPr>
-          <p:cNvPr id="6" name="Picture 5" descr="A screenshot of a chat&#10;&#10;AI-generated content may be incorrect.">
+          <p:cNvPr id="10" name="Picture 9" descr="A screenshot of a chat&#10;&#10;AI-generated content may be incorrect.">
             <a:extLst>
               <a:ext uri="{FF2B5EF4-FFF2-40B4-BE49-F238E27FC236}">
-                <a16:creationId xmlns:a16="http://schemas.microsoft.com/office/drawing/2014/main" id="{8AE88E73-E78C-87EA-96EF-8FDA8A7B6C4F}"/>
+                <a16:creationId xmlns:a16="http://schemas.microsoft.com/office/drawing/2014/main" id="{0E17932B-3639-0E78-BCDA-11B881B5A52E}"/>
               </a:ext>
             </a:extLst>
           </p:cNvPr>
@@ -5153,8 +5185,38 @@
         </p:blipFill>
         <p:spPr>
           <a:xfrm>
-            <a:off x="2712275" y="2252455"/>
-            <a:ext cx="5679545" cy="4492402"/>
+            <a:off x="219559" y="1350961"/>
+            <a:ext cx="5985298" cy="5211532"/>
+          </a:xfrm>
+          <a:prstGeom prst="rect">
+            <a:avLst/>
+          </a:prstGeom>
+        </p:spPr>
+      </p:pic>
+      <p:pic>
+        <p:nvPicPr>
+          <p:cNvPr id="12" name="Picture 11" descr="A screenshot of a computer&#10;&#10;AI-generated content may be incorrect.">
+            <a:extLst>
+              <a:ext uri="{FF2B5EF4-FFF2-40B4-BE49-F238E27FC236}">
+                <a16:creationId xmlns:a16="http://schemas.microsoft.com/office/drawing/2014/main" id="{75E281A2-7B04-8121-CEC8-4AEA842E108E}"/>
+              </a:ext>
+            </a:extLst>
+          </p:cNvPr>
+          <p:cNvPicPr>
+            <a:picLocks noChangeAspect="1"/>
+          </p:cNvPicPr>
+          <p:nvPr/>
+        </p:nvPicPr>
+        <p:blipFill>
+          <a:blip r:embed="rId3"/>
+          <a:stretch>
+            <a:fillRect/>
+          </a:stretch>
+        </p:blipFill>
+        <p:spPr>
+          <a:xfrm>
+            <a:off x="6540469" y="1232452"/>
+            <a:ext cx="5431972" cy="5445362"/>
           </a:xfrm>
           <a:prstGeom prst="rect">
             <a:avLst/>
@@ -9187,20 +9249,20 @@
 </file>
 
 <file path=customXml/item1.xml><?xml version="1.0" encoding="utf-8"?>
-<p:properties xmlns:p="http://schemas.microsoft.com/office/2006/metadata/properties" xmlns:xsi="http://www.w3.org/2001/XMLSchema-instance" xmlns:pc="http://schemas.microsoft.com/office/infopath/2007/PartnerControls">
-  <documentManagement>
-    <_activity xmlns="b30265f8-c5e2-4918-b4a1-b977299ca3e2" xsi:nil="true"/>
-  </documentManagement>
-</p:properties>
-</file>
-
-<file path=customXml/item2.xml><?xml version="1.0" encoding="utf-8"?>
 <?mso-contentType ?>
 <FormTemplates xmlns="http://schemas.microsoft.com/sharepoint/v3/contenttype/forms">
   <Display>DocumentLibraryForm</Display>
   <Edit>DocumentLibraryForm</Edit>
   <New>DocumentLibraryForm</New>
 </FormTemplates>
+</file>
+
+<file path=customXml/item2.xml><?xml version="1.0" encoding="utf-8"?>
+<p:properties xmlns:p="http://schemas.microsoft.com/office/2006/metadata/properties" xmlns:xsi="http://www.w3.org/2001/XMLSchema-instance" xmlns:pc="http://schemas.microsoft.com/office/infopath/2007/PartnerControls">
+  <documentManagement>
+    <_activity xmlns="b30265f8-c5e2-4918-b4a1-b977299ca3e2" xsi:nil="true"/>
+  </documentManagement>
+</p:properties>
 </file>
 
 <file path=customXml/item3.xml><?xml version="1.0" encoding="utf-8"?>
@@ -9437,6 +9499,14 @@
 </file>
 
 <file path=customXml/itemProps1.xml><?xml version="1.0" encoding="utf-8"?>
+<ds:datastoreItem xmlns:ds="http://schemas.openxmlformats.org/officeDocument/2006/customXml" ds:itemID="{927BD4C1-B6B1-4715-ABF9-E660A51A4EA0}">
+  <ds:schemaRefs>
+    <ds:schemaRef ds:uri="http://schemas.microsoft.com/sharepoint/v3/contenttype/forms"/>
+  </ds:schemaRefs>
+</ds:datastoreItem>
+</file>
+
+<file path=customXml/itemProps2.xml><?xml version="1.0" encoding="utf-8"?>
 <ds:datastoreItem xmlns:ds="http://schemas.openxmlformats.org/officeDocument/2006/customXml" ds:itemID="{8D289AE2-D2AE-49D1-AFAC-3A79F6794255}">
   <ds:schemaRefs>
     <ds:schemaRef ds:uri="http://www.w3.org/XML/1998/namespace"/>
@@ -9449,14 +9519,6 @@
     <ds:schemaRef ds:uri="http://schemas.openxmlformats.org/package/2006/metadata/core-properties"/>
     <ds:schemaRef ds:uri="b30265f8-c5e2-4918-b4a1-b977299ca3e2"/>
     <ds:schemaRef ds:uri="http://schemas.microsoft.com/office/2006/metadata/properties"/>
-  </ds:schemaRefs>
-</ds:datastoreItem>
-</file>
-
-<file path=customXml/itemProps2.xml><?xml version="1.0" encoding="utf-8"?>
-<ds:datastoreItem xmlns:ds="http://schemas.openxmlformats.org/officeDocument/2006/customXml" ds:itemID="{927BD4C1-B6B1-4715-ABF9-E660A51A4EA0}">
-  <ds:schemaRefs>
-    <ds:schemaRef ds:uri="http://schemas.microsoft.com/sharepoint/v3/contenttype/forms"/>
   </ds:schemaRefs>
 </ds:datastoreItem>
 </file>

</xml_diff>